<commit_message>
Update for 5.0.9 release, issue #41
Update ReadParcelsFromHydroBase for unmodeled wells, other cleanup.
</commit_message>
<xml_diff>
--- a/resources/acreage-assignment/cds-ipy-files.pptx
+++ b/resources/acreage-assignment/cds-ipy-files.pptx
@@ -249,7 +249,7 @@
           <a:p>
             <a:fld id="{885DC983-89A6-42A4-9671-64B07A3DC089}" type="datetimeFigureOut">
               <a:rPr lang="en-US" smtClean="0"/>
-              <a:t>11/9/2020</a:t>
+              <a:t>2/14/2021</a:t>
             </a:fld>
             <a:endParaRPr lang="en-US" dirty="0"/>
           </a:p>
@@ -419,7 +419,7 @@
           <a:p>
             <a:fld id="{885DC983-89A6-42A4-9671-64B07A3DC089}" type="datetimeFigureOut">
               <a:rPr lang="en-US" smtClean="0"/>
-              <a:t>11/9/2020</a:t>
+              <a:t>2/14/2021</a:t>
             </a:fld>
             <a:endParaRPr lang="en-US" dirty="0"/>
           </a:p>
@@ -599,7 +599,7 @@
           <a:p>
             <a:fld id="{885DC983-89A6-42A4-9671-64B07A3DC089}" type="datetimeFigureOut">
               <a:rPr lang="en-US" smtClean="0"/>
-              <a:t>11/9/2020</a:t>
+              <a:t>2/14/2021</a:t>
             </a:fld>
             <a:endParaRPr lang="en-US" dirty="0"/>
           </a:p>
@@ -769,7 +769,7 @@
           <a:p>
             <a:fld id="{885DC983-89A6-42A4-9671-64B07A3DC089}" type="datetimeFigureOut">
               <a:rPr lang="en-US" smtClean="0"/>
-              <a:t>11/9/2020</a:t>
+              <a:t>2/14/2021</a:t>
             </a:fld>
             <a:endParaRPr lang="en-US" dirty="0"/>
           </a:p>
@@ -1015,7 +1015,7 @@
           <a:p>
             <a:fld id="{885DC983-89A6-42A4-9671-64B07A3DC089}" type="datetimeFigureOut">
               <a:rPr lang="en-US" smtClean="0"/>
-              <a:t>11/9/2020</a:t>
+              <a:t>2/14/2021</a:t>
             </a:fld>
             <a:endParaRPr lang="en-US" dirty="0"/>
           </a:p>
@@ -1247,7 +1247,7 @@
           <a:p>
             <a:fld id="{885DC983-89A6-42A4-9671-64B07A3DC089}" type="datetimeFigureOut">
               <a:rPr lang="en-US" smtClean="0"/>
-              <a:t>11/9/2020</a:t>
+              <a:t>2/14/2021</a:t>
             </a:fld>
             <a:endParaRPr lang="en-US" dirty="0"/>
           </a:p>
@@ -1614,7 +1614,7 @@
           <a:p>
             <a:fld id="{885DC983-89A6-42A4-9671-64B07A3DC089}" type="datetimeFigureOut">
               <a:rPr lang="en-US" smtClean="0"/>
-              <a:t>11/9/2020</a:t>
+              <a:t>2/14/2021</a:t>
             </a:fld>
             <a:endParaRPr lang="en-US" dirty="0"/>
           </a:p>
@@ -1732,7 +1732,7 @@
           <a:p>
             <a:fld id="{885DC983-89A6-42A4-9671-64B07A3DC089}" type="datetimeFigureOut">
               <a:rPr lang="en-US" smtClean="0"/>
-              <a:t>11/9/2020</a:t>
+              <a:t>2/14/2021</a:t>
             </a:fld>
             <a:endParaRPr lang="en-US" dirty="0"/>
           </a:p>
@@ -1827,7 +1827,7 @@
           <a:p>
             <a:fld id="{885DC983-89A6-42A4-9671-64B07A3DC089}" type="datetimeFigureOut">
               <a:rPr lang="en-US" smtClean="0"/>
-              <a:t>11/9/2020</a:t>
+              <a:t>2/14/2021</a:t>
             </a:fld>
             <a:endParaRPr lang="en-US" dirty="0"/>
           </a:p>
@@ -2104,7 +2104,7 @@
           <a:p>
             <a:fld id="{885DC983-89A6-42A4-9671-64B07A3DC089}" type="datetimeFigureOut">
               <a:rPr lang="en-US" smtClean="0"/>
-              <a:t>11/9/2020</a:t>
+              <a:t>2/14/2021</a:t>
             </a:fld>
             <a:endParaRPr lang="en-US" dirty="0"/>
           </a:p>
@@ -2357,7 +2357,7 @@
           <a:p>
             <a:fld id="{885DC983-89A6-42A4-9671-64B07A3DC089}" type="datetimeFigureOut">
               <a:rPr lang="en-US" smtClean="0"/>
-              <a:t>11/9/2020</a:t>
+              <a:t>2/14/2021</a:t>
             </a:fld>
             <a:endParaRPr lang="en-US" dirty="0"/>
           </a:p>
@@ -2570,7 +2570,7 @@
           <a:p>
             <a:fld id="{885DC983-89A6-42A4-9671-64B07A3DC089}" type="datetimeFigureOut">
               <a:rPr lang="en-US" smtClean="0"/>
-              <a:t>11/9/2020</a:t>
+              <a:t>2/14/2021</a:t>
             </a:fld>
             <a:endParaRPr lang="en-US" dirty="0"/>
           </a:p>
@@ -3117,7 +3117,6 @@
               <a:rPr lang="en-US" b="1" dirty="0" smtClean="0"/>
               <a:t>Parcel / Supply Data Objects</a:t>
             </a:r>
-            <a:endParaRPr lang="en-US" b="1" dirty="0" smtClean="0"/>
           </a:p>
         </p:txBody>
       </p:sp>
@@ -3780,7 +3779,6 @@
               <a:rPr lang="en-US" b="1" dirty="0" smtClean="0"/>
               <a:t>Model Location / Parcel / Supply Data Objects</a:t>
             </a:r>
-            <a:endParaRPr lang="en-US" b="1" dirty="0" smtClean="0"/>
           </a:p>
         </p:txBody>
       </p:sp>
@@ -4127,88 +4125,10 @@
           </a:fontRef>
         </p:style>
       </p:cxnSp>
-      <p:sp>
-        <p:nvSpPr>
-          <p:cNvPr id="16" name="TextBox 15"/>
-          <p:cNvSpPr txBox="1"/>
-          <p:nvPr/>
-        </p:nvSpPr>
-        <p:spPr>
-          <a:xfrm>
-            <a:off x="1283378" y="2143065"/>
-            <a:ext cx="2578433" cy="1323439"/>
-          </a:xfrm>
-          <a:prstGeom prst="rect">
-            <a:avLst/>
-          </a:prstGeom>
-          <a:solidFill>
-            <a:schemeClr val="bg1"/>
-          </a:solidFill>
-          <a:ln w="25400">
-            <a:solidFill>
-              <a:schemeClr val="tx1"/>
-            </a:solidFill>
-          </a:ln>
-        </p:spPr>
-        <p:txBody>
-          <a:bodyPr wrap="square" rtlCol="0">
-            <a:spAutoFit/>
-          </a:bodyPr>
-          <a:lstStyle/>
-          <a:p>
-            <a:r>
-              <a:rPr lang="en-US" sz="1600" u="sng" dirty="0" smtClean="0"/>
-              <a:t>Model Location</a:t>
-            </a:r>
-          </a:p>
-          <a:p>
-            <a:pPr marL="285750" indent="-285750">
-              <a:buFontTx/>
-              <a:buChar char="-"/>
-            </a:pPr>
-            <a:r>
-              <a:rPr lang="en-US" sz="1600" dirty="0" smtClean="0"/>
-              <a:t>StateCU “CU Location” ID</a:t>
-            </a:r>
-          </a:p>
-          <a:p>
-            <a:pPr marL="742950" lvl="1" indent="-285750">
-              <a:buFontTx/>
-              <a:buChar char="-"/>
-            </a:pPr>
-            <a:r>
-              <a:rPr lang="en-US" sz="1600" dirty="0" smtClean="0"/>
-              <a:t>WDID or Receipt</a:t>
-            </a:r>
-          </a:p>
-          <a:p>
-            <a:pPr marL="285750" indent="-285750">
-              <a:buFontTx/>
-              <a:buChar char="-"/>
-            </a:pPr>
-            <a:r>
-              <a:rPr lang="en-US" sz="1600" dirty="0" smtClean="0"/>
-              <a:t>StateMod Station ID</a:t>
-            </a:r>
-          </a:p>
-          <a:p>
-            <a:pPr marL="742950" lvl="1" indent="-285750">
-              <a:buFontTx/>
-              <a:buChar char="-"/>
-            </a:pPr>
-            <a:r>
-              <a:rPr lang="en-US" sz="1600" dirty="0" smtClean="0"/>
-              <a:t>WDID</a:t>
-            </a:r>
-            <a:endParaRPr lang="en-US" sz="1600" dirty="0"/>
-          </a:p>
-        </p:txBody>
-      </p:sp>
       <p:cxnSp>
         <p:nvCxnSpPr>
           <p:cNvPr id="17" name="Straight Connector 16"/>
           <p:cNvCxnSpPr>
-            <a:stCxn id="16" idx="3"/>
             <a:endCxn id="2" idx="1"/>
           </p:cNvCxnSpPr>
           <p:nvPr/>
@@ -4242,6 +4162,106 @@
           </a:fontRef>
         </p:style>
       </p:cxnSp>
+      <p:sp>
+        <p:nvSpPr>
+          <p:cNvPr id="18" name="TextBox 17"/>
+          <p:cNvSpPr txBox="1"/>
+          <p:nvPr/>
+        </p:nvSpPr>
+        <p:spPr>
+          <a:xfrm>
+            <a:off x="451367" y="1986641"/>
+            <a:ext cx="3401828" cy="1569660"/>
+          </a:xfrm>
+          <a:prstGeom prst="rect">
+            <a:avLst/>
+          </a:prstGeom>
+          <a:solidFill>
+            <a:schemeClr val="bg1"/>
+          </a:solidFill>
+          <a:ln w="25400">
+            <a:solidFill>
+              <a:schemeClr val="tx1"/>
+            </a:solidFill>
+          </a:ln>
+        </p:spPr>
+        <p:txBody>
+          <a:bodyPr wrap="square" rtlCol="0">
+            <a:spAutoFit/>
+          </a:bodyPr>
+          <a:lstStyle/>
+          <a:p>
+            <a:r>
+              <a:rPr lang="en-US" sz="1600" u="sng" dirty="0" smtClean="0"/>
+              <a:t>Model Location</a:t>
+            </a:r>
+          </a:p>
+          <a:p>
+            <a:pPr marL="285750" indent="-285750">
+              <a:buFontTx/>
+              <a:buChar char="-"/>
+            </a:pPr>
+            <a:r>
+              <a:rPr lang="en-US" sz="1600" dirty="0" smtClean="0"/>
+              <a:t>StateCU “CU Location” </a:t>
+            </a:r>
+            <a:r>
+              <a:rPr lang="en-US" sz="1600" dirty="0" smtClean="0"/>
+              <a:t>or</a:t>
+            </a:r>
+            <a:endParaRPr lang="en-US" sz="1600" dirty="0" smtClean="0"/>
+          </a:p>
+          <a:p>
+            <a:r>
+              <a:rPr lang="en-US" sz="1600" dirty="0" smtClean="0"/>
+              <a:t>      </a:t>
+            </a:r>
+            <a:r>
+              <a:rPr lang="en-US" sz="1600" dirty="0" smtClean="0"/>
+              <a:t>StateMod</a:t>
+            </a:r>
+            <a:r>
+              <a:rPr lang="en-US" sz="1600" dirty="0" smtClean="0"/>
+              <a:t> </a:t>
+            </a:r>
+            <a:r>
+              <a:rPr lang="en-US" sz="1600" dirty="0" smtClean="0"/>
+              <a:t>Station ID</a:t>
+            </a:r>
+          </a:p>
+          <a:p>
+            <a:pPr marL="742950" lvl="1" indent="-285750">
+              <a:buFontTx/>
+              <a:buChar char="-"/>
+            </a:pPr>
+            <a:r>
+              <a:rPr lang="en-US" sz="1600" dirty="0" smtClean="0"/>
+              <a:t>WDID</a:t>
+            </a:r>
+          </a:p>
+          <a:p>
+            <a:pPr marL="742950" lvl="1" indent="-285750">
+              <a:buFontTx/>
+              <a:buChar char="-"/>
+            </a:pPr>
+            <a:r>
+              <a:rPr lang="en-US" sz="1600" dirty="0" smtClean="0"/>
+              <a:t>Aggregate/system ID</a:t>
+            </a:r>
+          </a:p>
+          <a:p>
+            <a:pPr marL="742950" lvl="1" indent="-285750">
+              <a:buFontTx/>
+              <a:buChar char="-"/>
+            </a:pPr>
+            <a:r>
+              <a:rPr lang="en-US" sz="1600" dirty="0" smtClean="0"/>
+              <a:t>Other ID to support modeling</a:t>
+            </a:r>
+            <a:endParaRPr lang="en-US" sz="1600" dirty="0"/>
+          </a:p>
+        </p:txBody>
+      </p:sp>
     </p:spTree>
     <p:extLst>
       <p:ext uri="{BB962C8B-B14F-4D97-AF65-F5344CB8AC3E}">
@@ -4560,7 +4580,6 @@
               <a:rPr lang="en-US" b="1" dirty="0" smtClean="0"/>
               <a:t>Model Location / Parcel / Supply Data Objects and Circular Relationships</a:t>
             </a:r>
-            <a:endParaRPr lang="en-US" b="1" dirty="0" smtClean="0"/>
           </a:p>
         </p:txBody>
       </p:sp>
@@ -4915,8 +4934,8 @@
         </p:nvSpPr>
         <p:spPr>
           <a:xfrm>
-            <a:off x="985204" y="2411421"/>
-            <a:ext cx="2578433" cy="1323439"/>
+            <a:off x="368483" y="2288311"/>
+            <a:ext cx="3401828" cy="1569660"/>
           </a:xfrm>
           <a:prstGeom prst="rect">
             <a:avLst/>
@@ -4948,7 +4967,30 @@
             </a:pPr>
             <a:r>
               <a:rPr lang="en-US" sz="1600" dirty="0" smtClean="0"/>
-              <a:t>StateCU “CU Location” ID</a:t>
+              <a:t>StateCU “CU Location” </a:t>
+            </a:r>
+            <a:r>
+              <a:rPr lang="en-US" sz="1600" dirty="0" smtClean="0"/>
+              <a:t>or</a:t>
+            </a:r>
+            <a:endParaRPr lang="en-US" sz="1600" dirty="0" smtClean="0"/>
+          </a:p>
+          <a:p>
+            <a:r>
+              <a:rPr lang="en-US" sz="1600" dirty="0" smtClean="0"/>
+              <a:t>      </a:t>
+            </a:r>
+            <a:r>
+              <a:rPr lang="en-US" sz="1600" dirty="0" smtClean="0"/>
+              <a:t>StateMod</a:t>
+            </a:r>
+            <a:r>
+              <a:rPr lang="en-US" sz="1600" dirty="0" smtClean="0"/>
+              <a:t> </a:t>
+            </a:r>
+            <a:r>
+              <a:rPr lang="en-US" sz="1600" dirty="0" smtClean="0"/>
+              <a:t>Station ID</a:t>
             </a:r>
           </a:p>
           <a:p>
@@ -4958,17 +5000,7 @@
             </a:pPr>
             <a:r>
               <a:rPr lang="en-US" sz="1600" dirty="0" smtClean="0"/>
-              <a:t>WDID or Receipt</a:t>
-            </a:r>
-          </a:p>
-          <a:p>
-            <a:pPr marL="285750" indent="-285750">
-              <a:buFontTx/>
-              <a:buChar char="-"/>
-            </a:pPr>
-            <a:r>
-              <a:rPr lang="en-US" sz="1600" dirty="0" smtClean="0"/>
-              <a:t>StateMod Station ID</a:t>
+              <a:t>WDID</a:t>
             </a:r>
           </a:p>
           <a:p>
@@ -4978,7 +5010,17 @@
             </a:pPr>
             <a:r>
               <a:rPr lang="en-US" sz="1600" dirty="0" smtClean="0"/>
-              <a:t>WDID</a:t>
+              <a:t>Aggregate/system ID</a:t>
+            </a:r>
+          </a:p>
+          <a:p>
+            <a:pPr marL="742950" lvl="1" indent="-285750">
+              <a:buFontTx/>
+              <a:buChar char="-"/>
+            </a:pPr>
+            <a:r>
+              <a:rPr lang="en-US" sz="1600" dirty="0" smtClean="0"/>
+              <a:t>Other ID to support modeling</a:t>
             </a:r>
             <a:endParaRPr lang="en-US" sz="1600" dirty="0"/>
           </a:p>
@@ -4995,8 +5037,8 @@
         </p:nvCxnSpPr>
         <p:spPr>
           <a:xfrm>
-            <a:off x="3563637" y="3073141"/>
-            <a:ext cx="1103921" cy="1"/>
+            <a:off x="3770311" y="3073141"/>
+            <a:ext cx="897247" cy="1"/>
           </a:xfrm>
           <a:prstGeom prst="line">
             <a:avLst/>
@@ -5065,7 +5107,7 @@
           <a:lstStyle/>
           <a:p>
             <a:pPr algn="ctr"/>
-            <a:endParaRPr lang="en-US"/>
+            <a:endParaRPr lang="en-US" dirty="0"/>
           </a:p>
         </p:txBody>
       </p:sp>
@@ -5112,7 +5154,67 @@
           <a:lstStyle/>
           <a:p>
             <a:pPr algn="ctr"/>
-            <a:endParaRPr lang="en-US"/>
+            <a:endParaRPr lang="en-US" dirty="0"/>
+          </a:p>
+        </p:txBody>
+      </p:sp>
+      <p:sp>
+        <p:nvSpPr>
+          <p:cNvPr id="7" name="TextBox 6"/>
+          <p:cNvSpPr txBox="1"/>
+          <p:nvPr/>
+        </p:nvSpPr>
+        <p:spPr>
+          <a:xfrm>
+            <a:off x="2533377" y="4474791"/>
+            <a:ext cx="3718449" cy="523220"/>
+          </a:xfrm>
+          <a:prstGeom prst="rect">
+            <a:avLst/>
+          </a:prstGeom>
+          <a:noFill/>
+        </p:spPr>
+        <p:txBody>
+          <a:bodyPr wrap="square" rtlCol="0">
+            <a:spAutoFit/>
+          </a:bodyPr>
+          <a:lstStyle/>
+          <a:p>
+            <a:r>
+              <a:rPr lang="en-US" sz="1400" dirty="0" smtClean="0"/>
+              <a:t>Model node data use fraction of parcel area due to multiple supplies</a:t>
+            </a:r>
+            <a:endParaRPr lang="en-US" sz="1400" dirty="0"/>
+          </a:p>
+        </p:txBody>
+      </p:sp>
+      <p:sp>
+        <p:nvSpPr>
+          <p:cNvPr id="25" name="TextBox 24"/>
+          <p:cNvSpPr txBox="1"/>
+          <p:nvPr/>
+        </p:nvSpPr>
+        <p:spPr>
+          <a:xfrm>
+            <a:off x="2420600" y="1445991"/>
+            <a:ext cx="3718449" cy="523220"/>
+          </a:xfrm>
+          <a:prstGeom prst="rect">
+            <a:avLst/>
+          </a:prstGeom>
+          <a:noFill/>
+        </p:spPr>
+        <p:txBody>
+          <a:bodyPr wrap="square" rtlCol="0">
+            <a:spAutoFit/>
+          </a:bodyPr>
+          <a:lstStyle/>
+          <a:p>
+            <a:r>
+              <a:rPr lang="en-US" sz="1400" dirty="0" smtClean="0"/>
+              <a:t>Model node data use fraction of parcel area due to multiple supplies</a:t>
+            </a:r>
+            <a:endParaRPr lang="en-US" sz="1400" dirty="0"/>
           </a:p>
         </p:txBody>
       </p:sp>

</xml_diff>